<commit_message>
updated week one powerpoint"
</commit_message>
<xml_diff>
--- a/Week1/Week1.pptx
+++ b/Week1/Week1.pptx
@@ -7,10 +7,18 @@
   <p:sldIdLst>
     <p:sldId id="256" r:id="rId2"/>
     <p:sldId id="259" r:id="rId3"/>
-    <p:sldId id="257" r:id="rId4"/>
-    <p:sldId id="258" r:id="rId5"/>
-    <p:sldId id="260" r:id="rId6"/>
-    <p:sldId id="261" r:id="rId7"/>
+    <p:sldId id="263" r:id="rId4"/>
+    <p:sldId id="257" r:id="rId5"/>
+    <p:sldId id="258" r:id="rId6"/>
+    <p:sldId id="260" r:id="rId7"/>
+    <p:sldId id="264" r:id="rId8"/>
+    <p:sldId id="261" r:id="rId9"/>
+    <p:sldId id="265" r:id="rId10"/>
+    <p:sldId id="266" r:id="rId11"/>
+    <p:sldId id="267" r:id="rId12"/>
+    <p:sldId id="268" r:id="rId13"/>
+    <p:sldId id="269" r:id="rId14"/>
+    <p:sldId id="270" r:id="rId15"/>
   </p:sldIdLst>
   <p:sldSz cx="12192000" cy="6858000"/>
   <p:notesSz cx="6858000" cy="9144000"/>
@@ -109,6 +117,11 @@
       </a:defRPr>
     </a:lvl9pPr>
   </p:defaultTextStyle>
+  <p:extLst>
+    <p:ext uri="{EFAFB233-063F-42B5-8137-9DF3F51BA10A}">
+      <p15:sldGuideLst xmlns:p15="http://schemas.microsoft.com/office/powerpoint/2012/main"/>
+    </p:ext>
+  </p:extLst>
 </p:presentation>
 </file>
 
@@ -350,7 +363,7 @@
           <a:p>
             <a:fld id="{ED291B17-9318-49DB-B28B-6E5994AE9581}" type="datetime1">
               <a:rPr lang="en-US" smtClean="0"/>
-              <a:t>4/30/20</a:t>
+              <a:t>5/15/20</a:t>
             </a:fld>
             <a:endParaRPr lang="en-US" dirty="0"/>
           </a:p>
@@ -553,7 +566,7 @@
           <a:p>
             <a:fld id="{2CED4963-E985-44C4-B8C4-FDD613B7C2F8}" type="datetime1">
               <a:rPr lang="en-US" smtClean="0"/>
-              <a:t>4/30/20</a:t>
+              <a:t>5/15/20</a:t>
             </a:fld>
             <a:endParaRPr lang="en-US" dirty="0"/>
           </a:p>
@@ -915,7 +928,7 @@
           <a:p>
             <a:fld id="{ED291B17-9318-49DB-B28B-6E5994AE9581}" type="datetime1">
               <a:rPr lang="en-US" smtClean="0"/>
-              <a:t>4/30/20</a:t>
+              <a:t>5/15/20</a:t>
             </a:fld>
             <a:endParaRPr lang="en-US" dirty="0"/>
           </a:p>
@@ -1113,7 +1126,7 @@
           <a:p>
             <a:fld id="{78DD82B9-B8EE-4375-B6FF-88FA6ABB15D9}" type="datetime1">
               <a:rPr lang="en-US" smtClean="0"/>
-              <a:t>4/30/20</a:t>
+              <a:t>5/15/20</a:t>
             </a:fld>
             <a:endParaRPr lang="en-US" dirty="0"/>
           </a:p>
@@ -1425,7 +1438,7 @@
           <a:p>
             <a:fld id="{B2497495-0637-405E-AE64-5CC7506D51F5}" type="datetime1">
               <a:rPr lang="en-US" smtClean="0"/>
-              <a:t>4/30/20</a:t>
+              <a:t>5/15/20</a:t>
             </a:fld>
             <a:endParaRPr lang="en-US" dirty="0"/>
           </a:p>
@@ -1678,7 +1691,7 @@
           <a:p>
             <a:fld id="{7BFFD690-9426-415D-8B65-26881E07B2D4}" type="datetime1">
               <a:rPr lang="en-US" smtClean="0"/>
-              <a:t>4/30/20</a:t>
+              <a:t>5/15/20</a:t>
             </a:fld>
             <a:endParaRPr lang="en-US" dirty="0"/>
           </a:p>
@@ -2100,7 +2113,7 @@
           <a:p>
             <a:fld id="{04C4989A-474C-40DE-95B9-011C28B71673}" type="datetime1">
               <a:rPr lang="en-US" smtClean="0"/>
-              <a:t>4/30/20</a:t>
+              <a:t>5/15/20</a:t>
             </a:fld>
             <a:endParaRPr lang="en-US" dirty="0"/>
           </a:p>
@@ -2223,7 +2236,7 @@
           <a:p>
             <a:fld id="{5DB4ED54-5B5E-4A04-93D3-5772E3CE3818}" type="datetime1">
               <a:rPr lang="en-US" smtClean="0"/>
-              <a:t>4/30/20</a:t>
+              <a:t>5/15/20</a:t>
             </a:fld>
             <a:endParaRPr lang="en-US" dirty="0"/>
           </a:p>
@@ -2318,7 +2331,7 @@
           <a:p>
             <a:fld id="{4EDE50D6-574B-40AF-946F-D52A04ADE379}" type="datetime1">
               <a:rPr lang="en-US" smtClean="0"/>
-              <a:t>4/30/20</a:t>
+              <a:t>5/15/20</a:t>
             </a:fld>
             <a:endParaRPr lang="en-US" dirty="0"/>
           </a:p>
@@ -2695,7 +2708,7 @@
           <a:p>
             <a:fld id="{D82884F1-FFEA-405F-9602-3DCA865EDA4E}" type="datetime1">
               <a:rPr lang="en-US" smtClean="0"/>
-              <a:t>4/30/20</a:t>
+              <a:t>5/15/20</a:t>
             </a:fld>
             <a:endParaRPr lang="en-US" dirty="0"/>
           </a:p>
@@ -2988,7 +3001,7 @@
           <a:p>
             <a:fld id="{7E18DB4A-8810-4A10-AD5C-D5E2C667F5B3}" type="datetime1">
               <a:rPr lang="en-US" smtClean="0"/>
-              <a:t>4/30/20</a:t>
+              <a:t>5/15/20</a:t>
             </a:fld>
             <a:endParaRPr lang="en-US" dirty="0"/>
           </a:p>
@@ -3203,7 +3216,7 @@
           <a:p>
             <a:fld id="{ED291B17-9318-49DB-B28B-6E5994AE9581}" type="datetime1">
               <a:rPr lang="en-US" smtClean="0"/>
-              <a:t>4/30/20</a:t>
+              <a:t>5/15/20</a:t>
             </a:fld>
             <a:endParaRPr lang="en-US" dirty="0"/>
           </a:p>
@@ -4133,6 +4146,1034 @@
 </p:sld>
 </file>
 
+<file path=ppt/slides/slide10.xml><?xml version="1.0" encoding="utf-8"?>
+<p:sld xmlns:a="http://schemas.openxmlformats.org/drawingml/2006/main" xmlns:r="http://schemas.openxmlformats.org/officeDocument/2006/relationships" xmlns:p="http://schemas.openxmlformats.org/presentationml/2006/main">
+  <p:cSld>
+    <p:spTree>
+      <p:nvGrpSpPr>
+        <p:cNvPr id="1" name=""/>
+        <p:cNvGrpSpPr/>
+        <p:nvPr/>
+      </p:nvGrpSpPr>
+      <p:grpSpPr>
+        <a:xfrm>
+          <a:off x="0" y="0"/>
+          <a:ext cx="0" cy="0"/>
+          <a:chOff x="0" y="0"/>
+          <a:chExt cx="0" cy="0"/>
+        </a:xfrm>
+      </p:grpSpPr>
+      <p:pic>
+        <p:nvPicPr>
+          <p:cNvPr id="5" name="Picture 4" descr="A screenshot of a cell phone&#10;&#10;Description automatically generated">
+            <a:extLst>
+              <a:ext uri="{FF2B5EF4-FFF2-40B4-BE49-F238E27FC236}">
+                <a16:creationId xmlns:a16="http://schemas.microsoft.com/office/drawing/2014/main" id="{D1AACFCB-BBB9-F84F-ACF8-B6423DFAFC4C}"/>
+              </a:ext>
+            </a:extLst>
+          </p:cNvPr>
+          <p:cNvPicPr>
+            <a:picLocks noChangeAspect="1"/>
+          </p:cNvPicPr>
+          <p:nvPr/>
+        </p:nvPicPr>
+        <p:blipFill>
+          <a:blip r:embed="rId2"/>
+          <a:stretch>
+            <a:fillRect/>
+          </a:stretch>
+        </p:blipFill>
+        <p:spPr>
+          <a:xfrm>
+            <a:off x="6867525" y="1143000"/>
+            <a:ext cx="5154779" cy="3429000"/>
+          </a:xfrm>
+          <a:prstGeom prst="rect">
+            <a:avLst/>
+          </a:prstGeom>
+        </p:spPr>
+      </p:pic>
+      <p:sp>
+        <p:nvSpPr>
+          <p:cNvPr id="2" name="Title 1">
+            <a:extLst>
+              <a:ext uri="{FF2B5EF4-FFF2-40B4-BE49-F238E27FC236}">
+                <a16:creationId xmlns:a16="http://schemas.microsoft.com/office/drawing/2014/main" id="{D22045D0-3EE1-BE4F-9B3C-E691251FCA5E}"/>
+              </a:ext>
+            </a:extLst>
+          </p:cNvPr>
+          <p:cNvSpPr>
+            <a:spLocks noGrp="1"/>
+          </p:cNvSpPr>
+          <p:nvPr>
+            <p:ph type="title"/>
+          </p:nvPr>
+        </p:nvSpPr>
+        <p:spPr/>
+        <p:txBody>
+          <a:bodyPr/>
+          <a:lstStyle/>
+          <a:p>
+            <a:r>
+              <a:rPr lang="en-US" dirty="0"/>
+              <a:t>Hour 2 – Command line</a:t>
+            </a:r>
+          </a:p>
+        </p:txBody>
+      </p:sp>
+      <p:sp>
+        <p:nvSpPr>
+          <p:cNvPr id="3" name="Content Placeholder 2">
+            <a:extLst>
+              <a:ext uri="{FF2B5EF4-FFF2-40B4-BE49-F238E27FC236}">
+                <a16:creationId xmlns:a16="http://schemas.microsoft.com/office/drawing/2014/main" id="{868210CE-ED3E-CC4A-ACA1-C1C6688E3440}"/>
+              </a:ext>
+            </a:extLst>
+          </p:cNvPr>
+          <p:cNvSpPr>
+            <a:spLocks noGrp="1"/>
+          </p:cNvSpPr>
+          <p:nvPr>
+            <p:ph idx="1"/>
+          </p:nvPr>
+        </p:nvSpPr>
+        <p:spPr/>
+        <p:txBody>
+          <a:bodyPr>
+            <a:normAutofit/>
+          </a:bodyPr>
+          <a:lstStyle/>
+          <a:p>
+            <a:r>
+              <a:rPr lang="en-US" dirty="0"/>
+              <a:t>And Jobs Said “Let there be GUIs”</a:t>
+            </a:r>
+          </a:p>
+          <a:p>
+            <a:r>
+              <a:rPr lang="en-US" dirty="0"/>
+              <a:t>DOS – Bill Gates baby – very basic, DIR, MKDIR, CD, </a:t>
+            </a:r>
+          </a:p>
+          <a:p>
+            <a:r>
+              <a:rPr lang="en-US" dirty="0"/>
+              <a:t>Unix Shells – Many shells most popular is BASH (</a:t>
+            </a:r>
+            <a:r>
+              <a:rPr lang="en-US" dirty="0">
+                <a:solidFill>
+                  <a:srgbClr val="FF0000"/>
+                </a:solidFill>
+              </a:rPr>
+              <a:t>Bourne</a:t>
+            </a:r>
+            <a:r>
+              <a:rPr lang="en-US" dirty="0"/>
+              <a:t> </a:t>
+            </a:r>
+            <a:r>
+              <a:rPr lang="en-US" dirty="0">
+                <a:solidFill>
+                  <a:srgbClr val="FF0000"/>
+                </a:solidFill>
+              </a:rPr>
+              <a:t>Again Shell)</a:t>
+            </a:r>
+          </a:p>
+          <a:p>
+            <a:r>
+              <a:rPr lang="en-US" dirty="0"/>
+              <a:t>Let’s take a quick look…</a:t>
+            </a:r>
+          </a:p>
+          <a:p>
+            <a:r>
+              <a:rPr lang="en-US" dirty="0"/>
+              <a:t>Why the shell? Fundamental tool for developers.</a:t>
+            </a:r>
+          </a:p>
+          <a:p>
+            <a:r>
+              <a:rPr lang="en-US" dirty="0"/>
+              <a:t>There are some things that you can only do in the shell</a:t>
+            </a:r>
+          </a:p>
+          <a:p>
+            <a:r>
+              <a:rPr lang="en-US" dirty="0"/>
+              <a:t>Terminal or Console or Command Line</a:t>
+            </a:r>
+          </a:p>
+          <a:p>
+            <a:endParaRPr lang="en-US" dirty="0"/>
+          </a:p>
+        </p:txBody>
+      </p:sp>
+    </p:spTree>
+    <p:extLst>
+      <p:ext uri="{BB962C8B-B14F-4D97-AF65-F5344CB8AC3E}">
+        <p14:creationId xmlns:p14="http://schemas.microsoft.com/office/powerpoint/2010/main" val="3850498293"/>
+      </p:ext>
+    </p:extLst>
+  </p:cSld>
+  <p:clrMapOvr>
+    <a:masterClrMapping/>
+  </p:clrMapOvr>
+</p:sld>
+</file>
+
+<file path=ppt/slides/slide11.xml><?xml version="1.0" encoding="utf-8"?>
+<p:sld xmlns:a="http://schemas.openxmlformats.org/drawingml/2006/main" xmlns:r="http://schemas.openxmlformats.org/officeDocument/2006/relationships" xmlns:p="http://schemas.openxmlformats.org/presentationml/2006/main">
+  <p:cSld>
+    <p:spTree>
+      <p:nvGrpSpPr>
+        <p:cNvPr id="1" name=""/>
+        <p:cNvGrpSpPr/>
+        <p:nvPr/>
+      </p:nvGrpSpPr>
+      <p:grpSpPr>
+        <a:xfrm>
+          <a:off x="0" y="0"/>
+          <a:ext cx="0" cy="0"/>
+          <a:chOff x="0" y="0"/>
+          <a:chExt cx="0" cy="0"/>
+        </a:xfrm>
+      </p:grpSpPr>
+      <p:pic>
+        <p:nvPicPr>
+          <p:cNvPr id="6" name="Picture 5" descr="A screenshot of a cell phone&#10;&#10;Description automatically generated">
+            <a:extLst>
+              <a:ext uri="{FF2B5EF4-FFF2-40B4-BE49-F238E27FC236}">
+                <a16:creationId xmlns:a16="http://schemas.microsoft.com/office/drawing/2014/main" id="{29E7C098-E812-C647-A2D3-0B52AB7552D7}"/>
+              </a:ext>
+            </a:extLst>
+          </p:cNvPr>
+          <p:cNvPicPr>
+            <a:picLocks noChangeAspect="1"/>
+          </p:cNvPicPr>
+          <p:nvPr/>
+        </p:nvPicPr>
+        <p:blipFill>
+          <a:blip r:embed="rId2"/>
+          <a:stretch>
+            <a:fillRect/>
+          </a:stretch>
+        </p:blipFill>
+        <p:spPr>
+          <a:xfrm>
+            <a:off x="6251574" y="1046607"/>
+            <a:ext cx="5497155" cy="4182618"/>
+          </a:xfrm>
+          <a:prstGeom prst="rect">
+            <a:avLst/>
+          </a:prstGeom>
+        </p:spPr>
+      </p:pic>
+      <p:sp>
+        <p:nvSpPr>
+          <p:cNvPr id="2" name="Title 1">
+            <a:extLst>
+              <a:ext uri="{FF2B5EF4-FFF2-40B4-BE49-F238E27FC236}">
+                <a16:creationId xmlns:a16="http://schemas.microsoft.com/office/drawing/2014/main" id="{D22045D0-3EE1-BE4F-9B3C-E691251FCA5E}"/>
+              </a:ext>
+            </a:extLst>
+          </p:cNvPr>
+          <p:cNvSpPr>
+            <a:spLocks noGrp="1"/>
+          </p:cNvSpPr>
+          <p:nvPr>
+            <p:ph type="title"/>
+          </p:nvPr>
+        </p:nvSpPr>
+        <p:spPr/>
+        <p:txBody>
+          <a:bodyPr/>
+          <a:lstStyle/>
+          <a:p>
+            <a:r>
+              <a:rPr lang="en-US" dirty="0"/>
+              <a:t>Hour 2 – Command line</a:t>
+            </a:r>
+          </a:p>
+        </p:txBody>
+      </p:sp>
+      <p:sp>
+        <p:nvSpPr>
+          <p:cNvPr id="3" name="Content Placeholder 2">
+            <a:extLst>
+              <a:ext uri="{FF2B5EF4-FFF2-40B4-BE49-F238E27FC236}">
+                <a16:creationId xmlns:a16="http://schemas.microsoft.com/office/drawing/2014/main" id="{868210CE-ED3E-CC4A-ACA1-C1C6688E3440}"/>
+              </a:ext>
+            </a:extLst>
+          </p:cNvPr>
+          <p:cNvSpPr>
+            <a:spLocks noGrp="1"/>
+          </p:cNvSpPr>
+          <p:nvPr>
+            <p:ph idx="1"/>
+          </p:nvPr>
+        </p:nvSpPr>
+        <p:spPr/>
+        <p:txBody>
+          <a:bodyPr>
+            <a:normAutofit/>
+          </a:bodyPr>
+          <a:lstStyle/>
+          <a:p>
+            <a:r>
+              <a:rPr lang="en-US" dirty="0"/>
+              <a:t>Folders have other folders or files</a:t>
+            </a:r>
+          </a:p>
+          <a:p>
+            <a:r>
+              <a:rPr lang="en-US" dirty="0">
+                <a:solidFill>
+                  <a:schemeClr val="tx1"/>
+                </a:solidFill>
+              </a:rPr>
+              <a:t>Files have names and extensions (usually)</a:t>
+            </a:r>
+          </a:p>
+          <a:p>
+            <a:r>
+              <a:rPr lang="en-US" dirty="0"/>
+              <a:t>The full name of the file includes the left side and </a:t>
+            </a:r>
+            <a:r>
+              <a:rPr lang="en-US" dirty="0" err="1"/>
+              <a:t>ext</a:t>
+            </a:r>
+            <a:endParaRPr lang="en-US" dirty="0"/>
+          </a:p>
+          <a:p>
+            <a:r>
+              <a:rPr lang="en-US" dirty="0"/>
+              <a:t>Anything you can do using mouse you can do with terminal</a:t>
+            </a:r>
+          </a:p>
+          <a:p>
+            <a:endParaRPr lang="en-US" dirty="0"/>
+          </a:p>
+          <a:p>
+            <a:endParaRPr lang="en-US" dirty="0"/>
+          </a:p>
+        </p:txBody>
+      </p:sp>
+    </p:spTree>
+    <p:extLst>
+      <p:ext uri="{BB962C8B-B14F-4D97-AF65-F5344CB8AC3E}">
+        <p14:creationId xmlns:p14="http://schemas.microsoft.com/office/powerpoint/2010/main" val="683337748"/>
+      </p:ext>
+    </p:extLst>
+  </p:cSld>
+  <p:clrMapOvr>
+    <a:masterClrMapping/>
+  </p:clrMapOvr>
+</p:sld>
+</file>
+
+<file path=ppt/slides/slide12.xml><?xml version="1.0" encoding="utf-8"?>
+<p:sld xmlns:a="http://schemas.openxmlformats.org/drawingml/2006/main" xmlns:r="http://schemas.openxmlformats.org/officeDocument/2006/relationships" xmlns:p="http://schemas.openxmlformats.org/presentationml/2006/main">
+  <p:cSld>
+    <p:spTree>
+      <p:nvGrpSpPr>
+        <p:cNvPr id="1" name=""/>
+        <p:cNvGrpSpPr/>
+        <p:nvPr/>
+      </p:nvGrpSpPr>
+      <p:grpSpPr>
+        <a:xfrm>
+          <a:off x="0" y="0"/>
+          <a:ext cx="0" cy="0"/>
+          <a:chOff x="0" y="0"/>
+          <a:chExt cx="0" cy="0"/>
+        </a:xfrm>
+      </p:grpSpPr>
+      <p:sp>
+        <p:nvSpPr>
+          <p:cNvPr id="2" name="Title 1">
+            <a:extLst>
+              <a:ext uri="{FF2B5EF4-FFF2-40B4-BE49-F238E27FC236}">
+                <a16:creationId xmlns:a16="http://schemas.microsoft.com/office/drawing/2014/main" id="{0EE26AE6-8E11-8846-9CC7-6BA97E396E37}"/>
+              </a:ext>
+            </a:extLst>
+          </p:cNvPr>
+          <p:cNvSpPr>
+            <a:spLocks noGrp="1"/>
+          </p:cNvSpPr>
+          <p:nvPr>
+            <p:ph type="title"/>
+          </p:nvPr>
+        </p:nvSpPr>
+        <p:spPr/>
+        <p:txBody>
+          <a:bodyPr/>
+          <a:lstStyle/>
+          <a:p>
+            <a:r>
+              <a:rPr lang="en-US" dirty="0"/>
+              <a:t>Command line – Common commands</a:t>
+            </a:r>
+          </a:p>
+        </p:txBody>
+      </p:sp>
+      <p:sp>
+        <p:nvSpPr>
+          <p:cNvPr id="3" name="Content Placeholder 2">
+            <a:extLst>
+              <a:ext uri="{FF2B5EF4-FFF2-40B4-BE49-F238E27FC236}">
+                <a16:creationId xmlns:a16="http://schemas.microsoft.com/office/drawing/2014/main" id="{376A17E2-ED59-B247-87EC-9A8013F266CA}"/>
+              </a:ext>
+            </a:extLst>
+          </p:cNvPr>
+          <p:cNvSpPr>
+            <a:spLocks noGrp="1"/>
+          </p:cNvSpPr>
+          <p:nvPr>
+            <p:ph idx="1"/>
+          </p:nvPr>
+        </p:nvSpPr>
+        <p:spPr/>
+        <p:txBody>
+          <a:bodyPr>
+            <a:normAutofit/>
+          </a:bodyPr>
+          <a:lstStyle/>
+          <a:p>
+            <a:r>
+              <a:rPr lang="en-US" dirty="0"/>
+              <a:t>List all files. =&gt; BASH: ls or ls –al DOS: </a:t>
+            </a:r>
+            <a:r>
+              <a:rPr lang="en-US" dirty="0" err="1"/>
+              <a:t>dir</a:t>
+            </a:r>
+            <a:r>
+              <a:rPr lang="en-US" dirty="0"/>
+              <a:t> </a:t>
+            </a:r>
+          </a:p>
+          <a:p>
+            <a:r>
+              <a:rPr lang="en-US" dirty="0"/>
+              <a:t>Display current path =&gt; BASH: </a:t>
+            </a:r>
+            <a:r>
+              <a:rPr lang="en-US" dirty="0" err="1"/>
+              <a:t>pwd</a:t>
+            </a:r>
+            <a:endParaRPr lang="en-US" dirty="0"/>
+          </a:p>
+          <a:p>
+            <a:r>
+              <a:rPr lang="en-US" dirty="0"/>
+              <a:t>Move up to the parent directory: cd ..</a:t>
+            </a:r>
+          </a:p>
+          <a:p>
+            <a:r>
+              <a:rPr lang="en-US" dirty="0"/>
+              <a:t>Move to a child directory: cd </a:t>
+            </a:r>
+            <a:r>
+              <a:rPr lang="en-US" dirty="0" err="1"/>
+              <a:t>childName</a:t>
+            </a:r>
+            <a:endParaRPr lang="en-US" dirty="0"/>
+          </a:p>
+          <a:p>
+            <a:r>
+              <a:rPr lang="en-US" dirty="0"/>
+              <a:t>Create a director or folder: </a:t>
+            </a:r>
+            <a:r>
+              <a:rPr lang="en-US" dirty="0" err="1"/>
+              <a:t>mkdir</a:t>
+            </a:r>
+            <a:r>
+              <a:rPr lang="en-US" dirty="0"/>
+              <a:t> </a:t>
+            </a:r>
+            <a:r>
+              <a:rPr lang="en-US" dirty="0" err="1"/>
+              <a:t>folderName</a:t>
+            </a:r>
+            <a:endParaRPr lang="en-US" dirty="0"/>
+          </a:p>
+          <a:p>
+            <a:r>
+              <a:rPr lang="en-US" dirty="0"/>
+              <a:t>Run an executable file: BASH: ./filename DOS: filename</a:t>
+            </a:r>
+          </a:p>
+          <a:p>
+            <a:r>
+              <a:rPr lang="en-US" dirty="0"/>
+              <a:t>Move or rename a file: mv filename </a:t>
+            </a:r>
+            <a:r>
+              <a:rPr lang="en-US" dirty="0" err="1"/>
+              <a:t>newFileName</a:t>
+            </a:r>
+            <a:endParaRPr lang="en-US" dirty="0"/>
+          </a:p>
+          <a:p>
+            <a:r>
+              <a:rPr lang="en-US" dirty="0"/>
+              <a:t>Let’s take a look…</a:t>
+            </a:r>
+          </a:p>
+        </p:txBody>
+      </p:sp>
+    </p:spTree>
+    <p:extLst>
+      <p:ext uri="{BB962C8B-B14F-4D97-AF65-F5344CB8AC3E}">
+        <p14:creationId xmlns:p14="http://schemas.microsoft.com/office/powerpoint/2010/main" val="878488077"/>
+      </p:ext>
+    </p:extLst>
+  </p:cSld>
+  <p:clrMapOvr>
+    <a:masterClrMapping/>
+  </p:clrMapOvr>
+</p:sld>
+</file>
+
+<file path=ppt/slides/slide13.xml><?xml version="1.0" encoding="utf-8"?>
+<p:sld xmlns:a="http://schemas.openxmlformats.org/drawingml/2006/main" xmlns:r="http://schemas.openxmlformats.org/officeDocument/2006/relationships" xmlns:p="http://schemas.openxmlformats.org/presentationml/2006/main">
+  <p:cSld>
+    <p:spTree>
+      <p:nvGrpSpPr>
+        <p:cNvPr id="1" name=""/>
+        <p:cNvGrpSpPr/>
+        <p:nvPr/>
+      </p:nvGrpSpPr>
+      <p:grpSpPr>
+        <a:xfrm>
+          <a:off x="0" y="0"/>
+          <a:ext cx="0" cy="0"/>
+          <a:chOff x="0" y="0"/>
+          <a:chExt cx="0" cy="0"/>
+        </a:xfrm>
+      </p:grpSpPr>
+      <p:sp>
+        <p:nvSpPr>
+          <p:cNvPr id="2" name="Title 1">
+            <a:extLst>
+              <a:ext uri="{FF2B5EF4-FFF2-40B4-BE49-F238E27FC236}">
+                <a16:creationId xmlns:a16="http://schemas.microsoft.com/office/drawing/2014/main" id="{0EE26AE6-8E11-8846-9CC7-6BA97E396E37}"/>
+              </a:ext>
+            </a:extLst>
+          </p:cNvPr>
+          <p:cNvSpPr>
+            <a:spLocks noGrp="1"/>
+          </p:cNvSpPr>
+          <p:nvPr>
+            <p:ph type="title"/>
+          </p:nvPr>
+        </p:nvSpPr>
+        <p:spPr/>
+        <p:txBody>
+          <a:bodyPr/>
+          <a:lstStyle/>
+          <a:p>
+            <a:r>
+              <a:rPr lang="en-US" dirty="0"/>
+              <a:t>Command line – In Class lab</a:t>
+            </a:r>
+          </a:p>
+        </p:txBody>
+      </p:sp>
+      <p:sp>
+        <p:nvSpPr>
+          <p:cNvPr id="3" name="Content Placeholder 2">
+            <a:extLst>
+              <a:ext uri="{FF2B5EF4-FFF2-40B4-BE49-F238E27FC236}">
+                <a16:creationId xmlns:a16="http://schemas.microsoft.com/office/drawing/2014/main" id="{376A17E2-ED59-B247-87EC-9A8013F266CA}"/>
+              </a:ext>
+            </a:extLst>
+          </p:cNvPr>
+          <p:cNvSpPr>
+            <a:spLocks noGrp="1"/>
+          </p:cNvSpPr>
+          <p:nvPr>
+            <p:ph idx="1"/>
+          </p:nvPr>
+        </p:nvSpPr>
+        <p:spPr>
+          <a:xfrm>
+            <a:off x="5677300" y="2039781"/>
+            <a:ext cx="4570671" cy="3798037"/>
+          </a:xfrm>
+        </p:spPr>
+        <p:txBody>
+          <a:bodyPr>
+            <a:normAutofit/>
+          </a:bodyPr>
+          <a:lstStyle/>
+          <a:p>
+            <a:r>
+              <a:rPr lang="en-US" dirty="0"/>
+              <a:t>7. modify the file </a:t>
+            </a:r>
+            <a:r>
+              <a:rPr lang="en-US" dirty="0" err="1"/>
+              <a:t>data.txt</a:t>
+            </a:r>
+            <a:r>
+              <a:rPr lang="en-US" dirty="0"/>
+              <a:t> by adding a line</a:t>
+            </a:r>
+          </a:p>
+          <a:p>
+            <a:r>
+              <a:rPr lang="en-US" dirty="0"/>
+              <a:t>8. rename each </a:t>
+            </a:r>
+            <a:r>
+              <a:rPr lang="en-US" dirty="0" err="1"/>
+              <a:t>data.txt</a:t>
+            </a:r>
+            <a:r>
+              <a:rPr lang="en-US" dirty="0"/>
+              <a:t> file to data1.txt</a:t>
+            </a:r>
+          </a:p>
+          <a:p>
+            <a:r>
+              <a:rPr lang="en-US" dirty="0"/>
+              <a:t>9. navigate into the folder named child1</a:t>
+            </a:r>
+          </a:p>
+          <a:p>
+            <a:r>
+              <a:rPr lang="en-US" dirty="0"/>
+              <a:t>10. navigate up to the parent folder</a:t>
+            </a:r>
+          </a:p>
+          <a:p>
+            <a:r>
+              <a:rPr lang="en-US" dirty="0"/>
+              <a:t>11. use the history command to view your history</a:t>
+            </a:r>
+          </a:p>
+          <a:p>
+            <a:endParaRPr lang="en-US" dirty="0"/>
+          </a:p>
+        </p:txBody>
+      </p:sp>
+      <p:sp>
+        <p:nvSpPr>
+          <p:cNvPr id="4" name="Content Placeholder 2">
+            <a:extLst>
+              <a:ext uri="{FF2B5EF4-FFF2-40B4-BE49-F238E27FC236}">
+                <a16:creationId xmlns:a16="http://schemas.microsoft.com/office/drawing/2014/main" id="{887819E3-65BB-1044-AF2E-8EF881B9000B}"/>
+              </a:ext>
+            </a:extLst>
+          </p:cNvPr>
+          <p:cNvSpPr txBox="1">
+            <a:spLocks/>
+          </p:cNvSpPr>
+          <p:nvPr/>
+        </p:nvSpPr>
+        <p:spPr>
+          <a:xfrm>
+            <a:off x="733593" y="2493264"/>
+            <a:ext cx="4169228" cy="3634486"/>
+          </a:xfrm>
+          <a:prstGeom prst="rect">
+            <a:avLst/>
+          </a:prstGeom>
+        </p:spPr>
+        <p:txBody>
+          <a:bodyPr vert="horz" lIns="91440" tIns="45720" rIns="91440" bIns="45720" rtlCol="0" anchor="ctr">
+            <a:normAutofit lnSpcReduction="10000"/>
+          </a:bodyPr>
+          <a:lstStyle>
+            <a:lvl1pPr marL="306000" indent="-306000" algn="l" defTabSz="457200" rtl="0" eaLnBrk="1" latinLnBrk="0" hangingPunct="1">
+              <a:lnSpc>
+                <a:spcPct val="110000"/>
+              </a:lnSpc>
+              <a:spcBef>
+                <a:spcPct val="20000"/>
+              </a:spcBef>
+              <a:spcAft>
+                <a:spcPts val="600"/>
+              </a:spcAft>
+              <a:buClr>
+                <a:schemeClr val="accent1"/>
+              </a:buClr>
+              <a:buSzPct val="92000"/>
+              <a:buFont typeface="Wingdings 2" panose="05020102010507070707" pitchFamily="18" charset="2"/>
+              <a:buChar char=""/>
+              <a:defRPr sz="1900" kern="1200">
+                <a:solidFill>
+                  <a:schemeClr val="tx1">
+                    <a:lumMod val="75000"/>
+                    <a:lumOff val="25000"/>
+                  </a:schemeClr>
+                </a:solidFill>
+                <a:latin typeface="+mn-lt"/>
+                <a:ea typeface="+mn-ea"/>
+                <a:cs typeface="+mn-cs"/>
+              </a:defRPr>
+            </a:lvl1pPr>
+            <a:lvl2pPr marL="630000" indent="-306000" algn="l" defTabSz="457200" rtl="0" eaLnBrk="1" latinLnBrk="0" hangingPunct="1">
+              <a:spcBef>
+                <a:spcPct val="20000"/>
+              </a:spcBef>
+              <a:spcAft>
+                <a:spcPts val="600"/>
+              </a:spcAft>
+              <a:buClr>
+                <a:schemeClr val="accent1"/>
+              </a:buClr>
+              <a:buSzPct val="92000"/>
+              <a:buFont typeface="Wingdings 2" panose="05020102010507070707" pitchFamily="18" charset="2"/>
+              <a:buChar char=""/>
+              <a:defRPr sz="1700" kern="1200">
+                <a:solidFill>
+                  <a:schemeClr val="tx1">
+                    <a:lumMod val="75000"/>
+                    <a:lumOff val="25000"/>
+                  </a:schemeClr>
+                </a:solidFill>
+                <a:latin typeface="+mn-lt"/>
+                <a:ea typeface="+mn-ea"/>
+                <a:cs typeface="+mn-cs"/>
+              </a:defRPr>
+            </a:lvl2pPr>
+            <a:lvl3pPr marL="900000" indent="-270000" algn="l" defTabSz="457200" rtl="0" eaLnBrk="1" latinLnBrk="0" hangingPunct="1">
+              <a:spcBef>
+                <a:spcPct val="20000"/>
+              </a:spcBef>
+              <a:spcAft>
+                <a:spcPts val="600"/>
+              </a:spcAft>
+              <a:buClr>
+                <a:schemeClr val="accent1"/>
+              </a:buClr>
+              <a:buSzPct val="92000"/>
+              <a:buFont typeface="Wingdings 2" panose="05020102010507070707" pitchFamily="18" charset="2"/>
+              <a:buChar char=""/>
+              <a:defRPr sz="1500" kern="1200">
+                <a:solidFill>
+                  <a:schemeClr val="tx1">
+                    <a:lumMod val="75000"/>
+                    <a:lumOff val="25000"/>
+                  </a:schemeClr>
+                </a:solidFill>
+                <a:latin typeface="+mn-lt"/>
+                <a:ea typeface="+mn-ea"/>
+                <a:cs typeface="+mn-cs"/>
+              </a:defRPr>
+            </a:lvl3pPr>
+            <a:lvl4pPr marL="1242000" indent="-234000" algn="l" defTabSz="457200" rtl="0" eaLnBrk="1" latinLnBrk="0" hangingPunct="1">
+              <a:spcBef>
+                <a:spcPct val="20000"/>
+              </a:spcBef>
+              <a:spcAft>
+                <a:spcPts val="600"/>
+              </a:spcAft>
+              <a:buClr>
+                <a:schemeClr val="accent1"/>
+              </a:buClr>
+              <a:buSzPct val="92000"/>
+              <a:buFont typeface="Wingdings 2" panose="05020102010507070707" pitchFamily="18" charset="2"/>
+              <a:buChar char=""/>
+              <a:defRPr sz="1300" kern="1200">
+                <a:solidFill>
+                  <a:schemeClr val="tx1">
+                    <a:lumMod val="75000"/>
+                    <a:lumOff val="25000"/>
+                  </a:schemeClr>
+                </a:solidFill>
+                <a:latin typeface="+mn-lt"/>
+                <a:ea typeface="+mn-ea"/>
+                <a:cs typeface="+mn-cs"/>
+              </a:defRPr>
+            </a:lvl4pPr>
+            <a:lvl5pPr marL="1602000" indent="-234000" algn="l" defTabSz="457200" rtl="0" eaLnBrk="1" latinLnBrk="0" hangingPunct="1">
+              <a:spcBef>
+                <a:spcPct val="20000"/>
+              </a:spcBef>
+              <a:spcAft>
+                <a:spcPts val="600"/>
+              </a:spcAft>
+              <a:buClr>
+                <a:schemeClr val="accent1"/>
+              </a:buClr>
+              <a:buSzPct val="92000"/>
+              <a:buFont typeface="Wingdings 2" panose="05020102010507070707" pitchFamily="18" charset="2"/>
+              <a:buChar char=""/>
+              <a:defRPr sz="1300" kern="1200">
+                <a:solidFill>
+                  <a:schemeClr val="tx1">
+                    <a:lumMod val="75000"/>
+                    <a:lumOff val="25000"/>
+                  </a:schemeClr>
+                </a:solidFill>
+                <a:latin typeface="+mn-lt"/>
+                <a:ea typeface="+mn-ea"/>
+                <a:cs typeface="+mn-cs"/>
+              </a:defRPr>
+            </a:lvl5pPr>
+            <a:lvl6pPr marL="1900000" indent="-228600" algn="l" defTabSz="457200" rtl="0" eaLnBrk="1" latinLnBrk="0" hangingPunct="1">
+              <a:spcBef>
+                <a:spcPct val="20000"/>
+              </a:spcBef>
+              <a:spcAft>
+                <a:spcPts val="600"/>
+              </a:spcAft>
+              <a:buClr>
+                <a:schemeClr val="accent2"/>
+              </a:buClr>
+              <a:buSzPct val="92000"/>
+              <a:buFont typeface="Wingdings 2" panose="05020102010507070707" pitchFamily="18" charset="2"/>
+              <a:buChar char=""/>
+              <a:defRPr sz="1200" kern="1200">
+                <a:solidFill>
+                  <a:schemeClr val="tx2"/>
+                </a:solidFill>
+                <a:latin typeface="+mn-lt"/>
+                <a:ea typeface="+mn-ea"/>
+                <a:cs typeface="+mn-cs"/>
+              </a:defRPr>
+            </a:lvl6pPr>
+            <a:lvl7pPr marL="2200000" indent="-228600" algn="l" defTabSz="457200" rtl="0" eaLnBrk="1" latinLnBrk="0" hangingPunct="1">
+              <a:spcBef>
+                <a:spcPct val="20000"/>
+              </a:spcBef>
+              <a:spcAft>
+                <a:spcPts val="600"/>
+              </a:spcAft>
+              <a:buClr>
+                <a:schemeClr val="accent2"/>
+              </a:buClr>
+              <a:buSzPct val="92000"/>
+              <a:buFont typeface="Wingdings 2" panose="05020102010507070707" pitchFamily="18" charset="2"/>
+              <a:buChar char=""/>
+              <a:defRPr sz="1200" kern="1200">
+                <a:solidFill>
+                  <a:schemeClr val="tx2"/>
+                </a:solidFill>
+                <a:latin typeface="+mn-lt"/>
+                <a:ea typeface="+mn-ea"/>
+                <a:cs typeface="+mn-cs"/>
+              </a:defRPr>
+            </a:lvl7pPr>
+            <a:lvl8pPr marL="2500000" indent="-228600" algn="l" defTabSz="457200" rtl="0" eaLnBrk="1" latinLnBrk="0" hangingPunct="1">
+              <a:spcBef>
+                <a:spcPct val="20000"/>
+              </a:spcBef>
+              <a:spcAft>
+                <a:spcPts val="600"/>
+              </a:spcAft>
+              <a:buClr>
+                <a:schemeClr val="accent2"/>
+              </a:buClr>
+              <a:buSzPct val="92000"/>
+              <a:buFont typeface="Wingdings 2" panose="05020102010507070707" pitchFamily="18" charset="2"/>
+              <a:buChar char=""/>
+              <a:defRPr sz="1200" kern="1200">
+                <a:solidFill>
+                  <a:schemeClr val="tx2"/>
+                </a:solidFill>
+                <a:latin typeface="+mn-lt"/>
+                <a:ea typeface="+mn-ea"/>
+                <a:cs typeface="+mn-cs"/>
+              </a:defRPr>
+            </a:lvl8pPr>
+            <a:lvl9pPr marL="2800000" indent="-228600" algn="l" defTabSz="457200" rtl="0" eaLnBrk="1" latinLnBrk="0" hangingPunct="1">
+              <a:spcBef>
+                <a:spcPct val="20000"/>
+              </a:spcBef>
+              <a:spcAft>
+                <a:spcPts val="600"/>
+              </a:spcAft>
+              <a:buClr>
+                <a:schemeClr val="accent2"/>
+              </a:buClr>
+              <a:buSzPct val="92000"/>
+              <a:buFont typeface="Wingdings 2" panose="05020102010507070707" pitchFamily="18" charset="2"/>
+              <a:buChar char=""/>
+              <a:defRPr sz="1200" kern="1200">
+                <a:solidFill>
+                  <a:schemeClr val="tx2"/>
+                </a:solidFill>
+                <a:latin typeface="+mn-lt"/>
+                <a:ea typeface="+mn-ea"/>
+                <a:cs typeface="+mn-cs"/>
+              </a:defRPr>
+            </a:lvl9pPr>
+          </a:lstStyle>
+          <a:p>
+            <a:r>
+              <a:rPr lang="en-US" dirty="0"/>
+              <a:t>1. navigate to your home directory</a:t>
+            </a:r>
+          </a:p>
+          <a:p>
+            <a:r>
+              <a:rPr lang="en-US" dirty="0"/>
+              <a:t>2. create child folder named </a:t>
+            </a:r>
+            <a:r>
+              <a:rPr lang="en-US" dirty="0" err="1"/>
+              <a:t>mydocs</a:t>
+            </a:r>
+            <a:endParaRPr lang="en-US" dirty="0"/>
+          </a:p>
+          <a:p>
+            <a:r>
+              <a:rPr lang="en-US" dirty="0"/>
+              <a:t>3. navigate into that director</a:t>
+            </a:r>
+          </a:p>
+          <a:p>
+            <a:r>
+              <a:rPr lang="en-US" dirty="0"/>
+              <a:t>4. create another child folder name child1</a:t>
+            </a:r>
+          </a:p>
+          <a:p>
+            <a:r>
+              <a:rPr lang="en-US" dirty="0"/>
+              <a:t>5. create another child folder named child2</a:t>
+            </a:r>
+          </a:p>
+          <a:p>
+            <a:r>
+              <a:rPr lang="en-US" dirty="0"/>
+              <a:t>6. in each folder create two files named </a:t>
+            </a:r>
+            <a:r>
+              <a:rPr lang="en-US" dirty="0" err="1"/>
+              <a:t>data.txt</a:t>
+            </a:r>
+            <a:endParaRPr lang="en-US" dirty="0"/>
+          </a:p>
+          <a:p>
+            <a:endParaRPr lang="en-US" dirty="0"/>
+          </a:p>
+        </p:txBody>
+      </p:sp>
+    </p:spTree>
+    <p:extLst>
+      <p:ext uri="{BB962C8B-B14F-4D97-AF65-F5344CB8AC3E}">
+        <p14:creationId xmlns:p14="http://schemas.microsoft.com/office/powerpoint/2010/main" val="3422194816"/>
+      </p:ext>
+    </p:extLst>
+  </p:cSld>
+  <p:clrMapOvr>
+    <a:masterClrMapping/>
+  </p:clrMapOvr>
+</p:sld>
+</file>
+
+<file path=ppt/slides/slide14.xml><?xml version="1.0" encoding="utf-8"?>
+<p:sld xmlns:a="http://schemas.openxmlformats.org/drawingml/2006/main" xmlns:r="http://schemas.openxmlformats.org/officeDocument/2006/relationships" xmlns:p="http://schemas.openxmlformats.org/presentationml/2006/main">
+  <p:cSld>
+    <p:spTree>
+      <p:nvGrpSpPr>
+        <p:cNvPr id="1" name=""/>
+        <p:cNvGrpSpPr/>
+        <p:nvPr/>
+      </p:nvGrpSpPr>
+      <p:grpSpPr>
+        <a:xfrm>
+          <a:off x="0" y="0"/>
+          <a:ext cx="0" cy="0"/>
+          <a:chOff x="0" y="0"/>
+          <a:chExt cx="0" cy="0"/>
+        </a:xfrm>
+      </p:grpSpPr>
+      <p:sp>
+        <p:nvSpPr>
+          <p:cNvPr id="2" name="Title 1">
+            <a:extLst>
+              <a:ext uri="{FF2B5EF4-FFF2-40B4-BE49-F238E27FC236}">
+                <a16:creationId xmlns:a16="http://schemas.microsoft.com/office/drawing/2014/main" id="{0EE26AE6-8E11-8846-9CC7-6BA97E396E37}"/>
+              </a:ext>
+            </a:extLst>
+          </p:cNvPr>
+          <p:cNvSpPr>
+            <a:spLocks noGrp="1"/>
+          </p:cNvSpPr>
+          <p:nvPr>
+            <p:ph type="title"/>
+          </p:nvPr>
+        </p:nvSpPr>
+        <p:spPr/>
+        <p:txBody>
+          <a:bodyPr/>
+          <a:lstStyle/>
+          <a:p>
+            <a:r>
+              <a:rPr lang="en-US" dirty="0"/>
+              <a:t>Git commands</a:t>
+            </a:r>
+          </a:p>
+        </p:txBody>
+      </p:sp>
+      <p:sp>
+        <p:nvSpPr>
+          <p:cNvPr id="3" name="Content Placeholder 2">
+            <a:extLst>
+              <a:ext uri="{FF2B5EF4-FFF2-40B4-BE49-F238E27FC236}">
+                <a16:creationId xmlns:a16="http://schemas.microsoft.com/office/drawing/2014/main" id="{376A17E2-ED59-B247-87EC-9A8013F266CA}"/>
+              </a:ext>
+            </a:extLst>
+          </p:cNvPr>
+          <p:cNvSpPr>
+            <a:spLocks noGrp="1"/>
+          </p:cNvSpPr>
+          <p:nvPr>
+            <p:ph idx="1"/>
+          </p:nvPr>
+        </p:nvSpPr>
+        <p:spPr>
+          <a:xfrm>
+            <a:off x="581192" y="2117840"/>
+            <a:ext cx="4570671" cy="3798037"/>
+          </a:xfrm>
+        </p:spPr>
+        <p:txBody>
+          <a:bodyPr>
+            <a:normAutofit/>
+          </a:bodyPr>
+          <a:lstStyle/>
+          <a:p>
+            <a:r>
+              <a:rPr lang="en-US" dirty="0"/>
+              <a:t>Time permitting we can cover commands</a:t>
+            </a:r>
+          </a:p>
+          <a:p>
+            <a:r>
+              <a:rPr lang="en-US" dirty="0"/>
+              <a:t>Or go to break until 4PM</a:t>
+            </a:r>
+          </a:p>
+          <a:p>
+            <a:endParaRPr lang="en-US" dirty="0"/>
+          </a:p>
+        </p:txBody>
+      </p:sp>
+    </p:spTree>
+    <p:extLst>
+      <p:ext uri="{BB962C8B-B14F-4D97-AF65-F5344CB8AC3E}">
+        <p14:creationId xmlns:p14="http://schemas.microsoft.com/office/powerpoint/2010/main" val="2538822926"/>
+      </p:ext>
+    </p:extLst>
+  </p:cSld>
+  <p:clrMapOvr>
+    <a:masterClrMapping/>
+  </p:clrMapOvr>
+</p:sld>
+</file>
+
 <file path=ppt/slides/slide2.xml><?xml version="1.0" encoding="utf-8"?>
 <p:sld xmlns:a="http://schemas.openxmlformats.org/drawingml/2006/main" xmlns:r="http://schemas.openxmlformats.org/officeDocument/2006/relationships" xmlns:p="http://schemas.openxmlformats.org/presentationml/2006/main">
   <p:cSld>
@@ -4207,15 +5248,7 @@
           <a:p>
             <a:r>
               <a:rPr lang="en-US" dirty="0"/>
-              <a:t>This is one of three pieces of the web </a:t>
-            </a:r>
-            <a:r>
-              <a:rPr lang="en-US" dirty="0" err="1"/>
-              <a:t>fron</a:t>
-            </a:r>
-            <a:r>
-              <a:rPr lang="en-US" dirty="0"/>
-              <a:t> end technologies</a:t>
+              <a:t>This is one of three pieces of the web frontend technologies</a:t>
             </a:r>
           </a:p>
           <a:p>
@@ -4279,7 +5312,7 @@
           <p:cNvPr id="2" name="Title 1">
             <a:extLst>
               <a:ext uri="{FF2B5EF4-FFF2-40B4-BE49-F238E27FC236}">
-                <a16:creationId xmlns:a16="http://schemas.microsoft.com/office/drawing/2014/main" id="{0EE26AE6-8E11-8846-9CC7-6BA97E396E37}"/>
+                <a16:creationId xmlns:a16="http://schemas.microsoft.com/office/drawing/2014/main" id="{7DEDCC6F-7D2E-CF47-81A7-CECFBAF89F37}"/>
               </a:ext>
             </a:extLst>
           </p:cNvPr>
@@ -4296,10 +5329,9 @@
           <a:lstStyle/>
           <a:p>
             <a:r>
-              <a:rPr lang="en-US" dirty="0" err="1"/>
-              <a:t>javascript</a:t>
-            </a:r>
-            <a:endParaRPr lang="en-US" dirty="0"/>
+              <a:rPr lang="en-US" dirty="0"/>
+              <a:t>Expectations and objectives</a:t>
+            </a:r>
           </a:p>
         </p:txBody>
       </p:sp>
@@ -4308,7 +5340,7 @@
           <p:cNvPr id="3" name="Content Placeholder 2">
             <a:extLst>
               <a:ext uri="{FF2B5EF4-FFF2-40B4-BE49-F238E27FC236}">
-                <a16:creationId xmlns:a16="http://schemas.microsoft.com/office/drawing/2014/main" id="{376A17E2-ED59-B247-87EC-9A8013F266CA}"/>
+                <a16:creationId xmlns:a16="http://schemas.microsoft.com/office/drawing/2014/main" id="{44DB42F8-1AFB-6E40-8EE8-C2D369333AC8}"/>
               </a:ext>
             </a:extLst>
           </p:cNvPr>
@@ -4326,76 +5358,39 @@
           <a:p>
             <a:r>
               <a:rPr lang="en-US" dirty="0"/>
-              <a:t>What is it? High level language JIT</a:t>
-            </a:r>
-          </a:p>
-          <a:p>
-            <a:r>
-              <a:rPr lang="en-US" dirty="0"/>
-              <a:t>One of three core technologies for the world wide web; CSS, HTML, </a:t>
-            </a:r>
-            <a:r>
-              <a:rPr lang="en-US" dirty="0" err="1"/>
-              <a:t>Javascript</a:t>
-            </a:r>
-            <a:endParaRPr lang="en-US" dirty="0"/>
-          </a:p>
-          <a:p>
-            <a:r>
-              <a:rPr lang="en-US" dirty="0"/>
-              <a:t>JavaScript- Versatile, Dynamic Language</a:t>
-            </a:r>
-          </a:p>
-          <a:p>
-            <a:r>
-              <a:rPr lang="en-US" dirty="0"/>
-              <a:t>What it’s not – It is not related to Java - Java is to </a:t>
-            </a:r>
-            <a:r>
-              <a:rPr lang="en-US" dirty="0" err="1"/>
-              <a:t>Javascript</a:t>
-            </a:r>
-            <a:r>
-              <a:rPr lang="en-US" dirty="0"/>
-              <a:t> as ham is to hamburger</a:t>
-            </a:r>
-          </a:p>
-          <a:p>
-            <a:r>
-              <a:rPr lang="en-US" dirty="0" err="1"/>
-              <a:t>Defacto</a:t>
-            </a:r>
-            <a:r>
-              <a:rPr lang="en-US" dirty="0"/>
-              <a:t> front end language for the web</a:t>
-            </a:r>
-          </a:p>
-          <a:p>
-            <a:r>
-              <a:rPr lang="en-US" dirty="0"/>
-              <a:t>Can be used as a back end language with Node</a:t>
-            </a:r>
-          </a:p>
-          <a:p>
-            <a:r>
-              <a:rPr lang="en-US" dirty="0"/>
-              <a:t>The standard for JS is </a:t>
-            </a:r>
-            <a:r>
-              <a:rPr lang="en-US" dirty="0" err="1"/>
-              <a:t>ecmascript</a:t>
-            </a:r>
-            <a:endParaRPr lang="en-US" dirty="0"/>
-          </a:p>
-          <a:p>
-            <a:endParaRPr lang="en-US" dirty="0"/>
+              <a:t>Objective 1 - Fundamentals</a:t>
+            </a:r>
+          </a:p>
+          <a:p>
+            <a:r>
+              <a:rPr lang="en-US" dirty="0"/>
+              <a:t>Objective 2 – Taste of programming</a:t>
+            </a:r>
+          </a:p>
+          <a:p>
+            <a:r>
+              <a:rPr lang="en-US" dirty="0"/>
+              <a:t>Objective 3 – Acquire new skill</a:t>
+            </a:r>
+          </a:p>
+          <a:p>
+            <a:r>
+              <a:rPr lang="en-US" dirty="0"/>
+              <a:t>Objective 4 - Learn about algorithms</a:t>
+            </a:r>
+          </a:p>
+          <a:p>
+            <a:r>
+              <a:rPr lang="en-US" dirty="0"/>
+              <a:t>Making a PB&amp;J Sandwich</a:t>
+            </a:r>
           </a:p>
         </p:txBody>
       </p:sp>
     </p:spTree>
     <p:extLst>
       <p:ext uri="{BB962C8B-B14F-4D97-AF65-F5344CB8AC3E}">
-        <p14:creationId xmlns:p14="http://schemas.microsoft.com/office/powerpoint/2010/main" val="4041758555"/>
+        <p14:creationId xmlns:p14="http://schemas.microsoft.com/office/powerpoint/2010/main" val="2167750305"/>
       </p:ext>
     </p:extLst>
   </p:cSld>
@@ -4427,7 +5422,7 @@
           <p:cNvPr id="2" name="Title 1">
             <a:extLst>
               <a:ext uri="{FF2B5EF4-FFF2-40B4-BE49-F238E27FC236}">
-                <a16:creationId xmlns:a16="http://schemas.microsoft.com/office/drawing/2014/main" id="{041EA482-FF6A-7B4A-8C97-99C462608E65}"/>
+                <a16:creationId xmlns:a16="http://schemas.microsoft.com/office/drawing/2014/main" id="{0EE26AE6-8E11-8846-9CC7-6BA97E396E37}"/>
               </a:ext>
             </a:extLst>
           </p:cNvPr>
@@ -4444,10 +5439,17 @@
           <a:lstStyle/>
           <a:p>
             <a:r>
+              <a:rPr lang="en-US" dirty="0"/>
+              <a:t>What is </a:t>
+            </a:r>
+            <a:r>
               <a:rPr lang="en-US" dirty="0" err="1"/>
-              <a:t>Javascript</a:t>
-            </a:r>
-            <a:endParaRPr lang="en-US" dirty="0"/>
+              <a:t>javascript</a:t>
+            </a:r>
+            <a:r>
+              <a:rPr lang="en-US" dirty="0"/>
+              <a:t>?</a:t>
+            </a:r>
           </a:p>
         </p:txBody>
       </p:sp>
@@ -4456,7 +5458,7 @@
           <p:cNvPr id="3" name="Content Placeholder 2">
             <a:extLst>
               <a:ext uri="{FF2B5EF4-FFF2-40B4-BE49-F238E27FC236}">
-                <a16:creationId xmlns:a16="http://schemas.microsoft.com/office/drawing/2014/main" id="{C19E71AB-0C50-7A4F-A367-7B9FC95E3784}"/>
+                <a16:creationId xmlns:a16="http://schemas.microsoft.com/office/drawing/2014/main" id="{376A17E2-ED59-B247-87EC-9A8013F266CA}"/>
               </a:ext>
             </a:extLst>
           </p:cNvPr>
@@ -4474,53 +5476,76 @@
           <a:p>
             <a:r>
               <a:rPr lang="en-US" dirty="0"/>
-              <a:t>Most popular programming language of 2019 (Stack Overflow Survey 2019)</a:t>
-            </a:r>
-          </a:p>
-          <a:p>
-            <a:r>
-              <a:rPr lang="en-US" dirty="0"/>
-              <a:t>Top three web frameworks use JS (</a:t>
+              <a:t>What is it? High level language JIT</a:t>
+            </a:r>
+          </a:p>
+          <a:p>
+            <a:r>
+              <a:rPr lang="en-US" dirty="0"/>
+              <a:t>One of three core technologies for the world wide web; CSS, HTML, </a:t>
             </a:r>
             <a:r>
               <a:rPr lang="en-US" dirty="0" err="1"/>
-              <a:t>Jquery</a:t>
-            </a:r>
-            <a:r>
-              <a:rPr lang="en-US" dirty="0"/>
-              <a:t>, ReactJS, AngularJS)</a:t>
-            </a:r>
-          </a:p>
-          <a:p>
-            <a:r>
-              <a:rPr lang="en-US" dirty="0"/>
-              <a:t>Most popular back end language</a:t>
-            </a:r>
-          </a:p>
-          <a:p>
-            <a:r>
-              <a:rPr lang="en-US" dirty="0"/>
-              <a:t>Easy to learn but hard to master (stick with it)</a:t>
-            </a:r>
-          </a:p>
-          <a:p>
-            <a:r>
-              <a:rPr lang="en-US" dirty="0"/>
-              <a:t>Big evolution in the last 10 years</a:t>
-            </a:r>
-          </a:p>
-          <a:p>
-            <a:r>
-              <a:rPr lang="en-US" dirty="0"/>
-              <a:t>Prior to HTML 5 developers hated it but not many other options were available</a:t>
-            </a:r>
+              <a:t>Javascript</a:t>
+            </a:r>
+            <a:endParaRPr lang="en-US" dirty="0"/>
+          </a:p>
+          <a:p>
+            <a:r>
+              <a:rPr lang="en-US" dirty="0"/>
+              <a:t>JavaScript- Versatile, Dynamic Language</a:t>
+            </a:r>
+          </a:p>
+          <a:p>
+            <a:r>
+              <a:rPr lang="en-US" dirty="0"/>
+              <a:t>What it’s not – It is not related to Java - Java is to </a:t>
+            </a:r>
+            <a:r>
+              <a:rPr lang="en-US" dirty="0" err="1"/>
+              <a:t>Javascript</a:t>
+            </a:r>
+            <a:r>
+              <a:rPr lang="en-US" dirty="0"/>
+              <a:t> as ham is to hamburger</a:t>
+            </a:r>
+          </a:p>
+          <a:p>
+            <a:r>
+              <a:rPr lang="en-US" dirty="0" err="1"/>
+              <a:t>Defacto</a:t>
+            </a:r>
+            <a:r>
+              <a:rPr lang="en-US" dirty="0"/>
+              <a:t> front end language for the web</a:t>
+            </a:r>
+          </a:p>
+          <a:p>
+            <a:r>
+              <a:rPr lang="en-US" dirty="0"/>
+              <a:t>Can be used as a back end language with Node</a:t>
+            </a:r>
+          </a:p>
+          <a:p>
+            <a:r>
+              <a:rPr lang="en-US" dirty="0"/>
+              <a:t>The standard for JS is </a:t>
+            </a:r>
+            <a:r>
+              <a:rPr lang="en-US" dirty="0" err="1"/>
+              <a:t>ecmascript</a:t>
+            </a:r>
+            <a:endParaRPr lang="en-US" dirty="0"/>
+          </a:p>
+          <a:p>
+            <a:endParaRPr lang="en-US" dirty="0"/>
           </a:p>
         </p:txBody>
       </p:sp>
     </p:spTree>
     <p:extLst>
       <p:ext uri="{BB962C8B-B14F-4D97-AF65-F5344CB8AC3E}">
-        <p14:creationId xmlns:p14="http://schemas.microsoft.com/office/powerpoint/2010/main" val="1059078408"/>
+        <p14:creationId xmlns:p14="http://schemas.microsoft.com/office/powerpoint/2010/main" val="4041758555"/>
       </p:ext>
     </p:extLst>
   </p:cSld>
@@ -4552,7 +5577,7 @@
           <p:cNvPr id="2" name="Title 1">
             <a:extLst>
               <a:ext uri="{FF2B5EF4-FFF2-40B4-BE49-F238E27FC236}">
-                <a16:creationId xmlns:a16="http://schemas.microsoft.com/office/drawing/2014/main" id="{4E3A0F1C-16AB-384A-9E92-A2DE905FA61A}"/>
+                <a16:creationId xmlns:a16="http://schemas.microsoft.com/office/drawing/2014/main" id="{041EA482-FF6A-7B4A-8C97-99C462608E65}"/>
               </a:ext>
             </a:extLst>
           </p:cNvPr>
@@ -4570,7 +5595,15 @@
           <a:p>
             <a:r>
               <a:rPr lang="en-US" dirty="0"/>
-              <a:t>Front end vs. back end</a:t>
+              <a:t>What is </a:t>
+            </a:r>
+            <a:r>
+              <a:rPr lang="en-US" dirty="0" err="1"/>
+              <a:t>Javascript</a:t>
+            </a:r>
+            <a:r>
+              <a:rPr lang="en-US" dirty="0"/>
+              <a:t>? (Continued)</a:t>
             </a:r>
           </a:p>
         </p:txBody>
@@ -4580,7 +5613,7 @@
           <p:cNvPr id="3" name="Content Placeholder 2">
             <a:extLst>
               <a:ext uri="{FF2B5EF4-FFF2-40B4-BE49-F238E27FC236}">
-                <a16:creationId xmlns:a16="http://schemas.microsoft.com/office/drawing/2014/main" id="{C4CBA421-A493-3048-9B7B-A189375EC280}"/>
+                <a16:creationId xmlns:a16="http://schemas.microsoft.com/office/drawing/2014/main" id="{C19E71AB-0C50-7A4F-A367-7B9FC95E3784}"/>
               </a:ext>
             </a:extLst>
           </p:cNvPr>
@@ -4598,66 +5631,53 @@
           <a:p>
             <a:r>
               <a:rPr lang="en-US" dirty="0"/>
-              <a:t>Front end is what you see on your computer</a:t>
-            </a:r>
-          </a:p>
-          <a:p>
-            <a:r>
-              <a:rPr lang="en-US" dirty="0"/>
-              <a:t>The back end prepares data and pages and sends them to your browser</a:t>
-            </a:r>
-          </a:p>
-          <a:p>
-            <a:r>
-              <a:rPr lang="en-US" dirty="0"/>
-              <a:t>It also delivers CSS and JavaScript</a:t>
-            </a:r>
-          </a:p>
-          <a:p>
-            <a:r>
-              <a:rPr lang="en-US" dirty="0"/>
-              <a:t>The JS is compiled and executed by your browser (</a:t>
+              <a:t>Most popular programming language of 2019 (Stack Overflow Survey 2019)</a:t>
+            </a:r>
+          </a:p>
+          <a:p>
+            <a:r>
+              <a:rPr lang="en-US" dirty="0"/>
+              <a:t>Top three web frameworks use JS (</a:t>
             </a:r>
             <a:r>
               <a:rPr lang="en-US" dirty="0" err="1"/>
-              <a:t>Chrom</a:t>
-            </a:r>
-            <a:r>
-              <a:rPr lang="en-US" dirty="0"/>
-              <a:t>, </a:t>
-            </a:r>
-            <a:r>
-              <a:rPr lang="en-US" dirty="0" err="1"/>
-              <a:t>FireFox</a:t>
-            </a:r>
-            <a:r>
-              <a:rPr lang="en-US" dirty="0"/>
-              <a:t>, IE)</a:t>
-            </a:r>
-          </a:p>
-          <a:p>
-            <a:r>
-              <a:rPr lang="en-US" dirty="0"/>
-              <a:t>JS can be used in the back end as of recent years but it spent most of it’s infancy in the client</a:t>
-            </a:r>
-          </a:p>
-          <a:p>
-            <a:r>
-              <a:rPr lang="en-US" dirty="0"/>
-              <a:t>JS is excellent for manipulating the </a:t>
-            </a:r>
-            <a:r>
-              <a:rPr lang="en-US" dirty="0" err="1"/>
-              <a:t>dom</a:t>
-            </a:r>
-            <a:endParaRPr lang="en-US" dirty="0"/>
+              <a:t>Jquery</a:t>
+            </a:r>
+            <a:r>
+              <a:rPr lang="en-US" dirty="0"/>
+              <a:t>, ReactJS, AngularJS)</a:t>
+            </a:r>
+          </a:p>
+          <a:p>
+            <a:r>
+              <a:rPr lang="en-US" dirty="0"/>
+              <a:t>Most popular back end language</a:t>
+            </a:r>
+          </a:p>
+          <a:p>
+            <a:r>
+              <a:rPr lang="en-US" dirty="0"/>
+              <a:t>Easy to learn but hard to master (stick with it)</a:t>
+            </a:r>
+          </a:p>
+          <a:p>
+            <a:r>
+              <a:rPr lang="en-US" dirty="0"/>
+              <a:t>Big evolution in the last 10 years</a:t>
+            </a:r>
+          </a:p>
+          <a:p>
+            <a:r>
+              <a:rPr lang="en-US" dirty="0"/>
+              <a:t>Prior to HTML 5 developers hated it but not many other options were available</a:t>
+            </a:r>
           </a:p>
         </p:txBody>
       </p:sp>
     </p:spTree>
     <p:extLst>
       <p:ext uri="{BB962C8B-B14F-4D97-AF65-F5344CB8AC3E}">
-        <p14:creationId xmlns:p14="http://schemas.microsoft.com/office/powerpoint/2010/main" val="3781253005"/>
+        <p14:creationId xmlns:p14="http://schemas.microsoft.com/office/powerpoint/2010/main" val="1059078408"/>
       </p:ext>
     </p:extLst>
   </p:cSld>
@@ -4684,6 +5704,306 @@
           <a:chExt cx="0" cy="0"/>
         </a:xfrm>
       </p:grpSpPr>
+      <p:pic>
+        <p:nvPicPr>
+          <p:cNvPr id="5" name="Picture 4" descr="A close up of text on a black background&#10;&#10;Description automatically generated">
+            <a:extLst>
+              <a:ext uri="{FF2B5EF4-FFF2-40B4-BE49-F238E27FC236}">
+                <a16:creationId xmlns:a16="http://schemas.microsoft.com/office/drawing/2014/main" id="{0649D263-F250-CA4A-9185-168955DBE979}"/>
+              </a:ext>
+            </a:extLst>
+          </p:cNvPr>
+          <p:cNvPicPr>
+            <a:picLocks noChangeAspect="1"/>
+          </p:cNvPicPr>
+          <p:nvPr/>
+        </p:nvPicPr>
+        <p:blipFill>
+          <a:blip r:embed="rId2"/>
+          <a:stretch>
+            <a:fillRect/>
+          </a:stretch>
+        </p:blipFill>
+        <p:spPr>
+          <a:xfrm>
+            <a:off x="6442216" y="1072007"/>
+            <a:ext cx="5257800" cy="3086100"/>
+          </a:xfrm>
+          <a:prstGeom prst="rect">
+            <a:avLst/>
+          </a:prstGeom>
+        </p:spPr>
+      </p:pic>
+      <p:sp>
+        <p:nvSpPr>
+          <p:cNvPr id="2" name="Title 1">
+            <a:extLst>
+              <a:ext uri="{FF2B5EF4-FFF2-40B4-BE49-F238E27FC236}">
+                <a16:creationId xmlns:a16="http://schemas.microsoft.com/office/drawing/2014/main" id="{4E3A0F1C-16AB-384A-9E92-A2DE905FA61A}"/>
+              </a:ext>
+            </a:extLst>
+          </p:cNvPr>
+          <p:cNvSpPr>
+            <a:spLocks noGrp="1"/>
+          </p:cNvSpPr>
+          <p:nvPr>
+            <p:ph type="title"/>
+          </p:nvPr>
+        </p:nvSpPr>
+        <p:spPr/>
+        <p:txBody>
+          <a:bodyPr/>
+          <a:lstStyle/>
+          <a:p>
+            <a:r>
+              <a:rPr lang="en-US" dirty="0"/>
+              <a:t>Front end vs. back end</a:t>
+            </a:r>
+          </a:p>
+        </p:txBody>
+      </p:sp>
+      <p:sp>
+        <p:nvSpPr>
+          <p:cNvPr id="3" name="Content Placeholder 2">
+            <a:extLst>
+              <a:ext uri="{FF2B5EF4-FFF2-40B4-BE49-F238E27FC236}">
+                <a16:creationId xmlns:a16="http://schemas.microsoft.com/office/drawing/2014/main" id="{C4CBA421-A493-3048-9B7B-A189375EC280}"/>
+              </a:ext>
+            </a:extLst>
+          </p:cNvPr>
+          <p:cNvSpPr>
+            <a:spLocks noGrp="1"/>
+          </p:cNvSpPr>
+          <p:nvPr>
+            <p:ph idx="1"/>
+          </p:nvPr>
+        </p:nvSpPr>
+        <p:spPr/>
+        <p:txBody>
+          <a:bodyPr/>
+          <a:lstStyle/>
+          <a:p>
+            <a:r>
+              <a:rPr lang="en-US" dirty="0"/>
+              <a:t>Front end is what you see on your computer</a:t>
+            </a:r>
+          </a:p>
+          <a:p>
+            <a:r>
+              <a:rPr lang="en-US" dirty="0"/>
+              <a:t>Front end usually consists of HTML, CSS, JS</a:t>
+            </a:r>
+          </a:p>
+          <a:p>
+            <a:r>
+              <a:rPr lang="en-US" dirty="0"/>
+              <a:t>The backend stores data, files (HTML, CSS, JS)</a:t>
+            </a:r>
+            <a:endParaRPr lang="en-US" dirty="0">
+              <a:solidFill>
+                <a:schemeClr val="bg1"/>
+              </a:solidFill>
+            </a:endParaRPr>
+          </a:p>
+          <a:p>
+            <a:r>
+              <a:rPr lang="en-US" dirty="0"/>
+              <a:t>Files and data are delivered on demand to the frontend</a:t>
+            </a:r>
+          </a:p>
+          <a:p>
+            <a:r>
+              <a:rPr lang="en-US" dirty="0"/>
+              <a:t>The JS is compiled and executed by your browser (</a:t>
+            </a:r>
+            <a:r>
+              <a:rPr lang="en-US" dirty="0" err="1"/>
+              <a:t>Chrom</a:t>
+            </a:r>
+            <a:r>
+              <a:rPr lang="en-US" dirty="0"/>
+              <a:t>, </a:t>
+            </a:r>
+            <a:r>
+              <a:rPr lang="en-US" dirty="0" err="1"/>
+              <a:t>FireFox</a:t>
+            </a:r>
+            <a:r>
+              <a:rPr lang="en-US" dirty="0"/>
+              <a:t>, IE)</a:t>
+            </a:r>
+          </a:p>
+          <a:p>
+            <a:r>
+              <a:rPr lang="en-US" dirty="0"/>
+              <a:t>JS can be used in the back end as of recent years, but it spent most of it’s infancy in the client</a:t>
+            </a:r>
+          </a:p>
+          <a:p>
+            <a:r>
+              <a:rPr lang="en-US" dirty="0"/>
+              <a:t>JS is excellent for manipulating the </a:t>
+            </a:r>
+            <a:r>
+              <a:rPr lang="en-US" dirty="0" err="1"/>
+              <a:t>dom</a:t>
+            </a:r>
+            <a:endParaRPr lang="en-US" dirty="0"/>
+          </a:p>
+        </p:txBody>
+      </p:sp>
+    </p:spTree>
+    <p:extLst>
+      <p:ext uri="{BB962C8B-B14F-4D97-AF65-F5344CB8AC3E}">
+        <p14:creationId xmlns:p14="http://schemas.microsoft.com/office/powerpoint/2010/main" val="3781253005"/>
+      </p:ext>
+    </p:extLst>
+  </p:cSld>
+  <p:clrMapOvr>
+    <a:masterClrMapping/>
+  </p:clrMapOvr>
+</p:sld>
+</file>
+
+<file path=ppt/slides/slide7.xml><?xml version="1.0" encoding="utf-8"?>
+<p:sld xmlns:a="http://schemas.openxmlformats.org/drawingml/2006/main" xmlns:r="http://schemas.openxmlformats.org/officeDocument/2006/relationships" xmlns:p="http://schemas.openxmlformats.org/presentationml/2006/main">
+  <p:cSld>
+    <p:spTree>
+      <p:nvGrpSpPr>
+        <p:cNvPr id="1" name=""/>
+        <p:cNvGrpSpPr/>
+        <p:nvPr/>
+      </p:nvGrpSpPr>
+      <p:grpSpPr>
+        <a:xfrm>
+          <a:off x="0" y="0"/>
+          <a:ext cx="0" cy="0"/>
+          <a:chOff x="0" y="0"/>
+          <a:chExt cx="0" cy="0"/>
+        </a:xfrm>
+      </p:grpSpPr>
+      <p:sp>
+        <p:nvSpPr>
+          <p:cNvPr id="2" name="Title 1">
+            <a:extLst>
+              <a:ext uri="{FF2B5EF4-FFF2-40B4-BE49-F238E27FC236}">
+                <a16:creationId xmlns:a16="http://schemas.microsoft.com/office/drawing/2014/main" id="{0EE26AE6-8E11-8846-9CC7-6BA97E396E37}"/>
+              </a:ext>
+            </a:extLst>
+          </p:cNvPr>
+          <p:cNvSpPr>
+            <a:spLocks noGrp="1"/>
+          </p:cNvSpPr>
+          <p:nvPr>
+            <p:ph type="title"/>
+          </p:nvPr>
+        </p:nvSpPr>
+        <p:spPr/>
+        <p:txBody>
+          <a:bodyPr/>
+          <a:lstStyle/>
+          <a:p>
+            <a:r>
+              <a:rPr lang="en-US" dirty="0"/>
+              <a:t>Art or science?</a:t>
+            </a:r>
+          </a:p>
+        </p:txBody>
+      </p:sp>
+      <p:sp>
+        <p:nvSpPr>
+          <p:cNvPr id="3" name="Content Placeholder 2">
+            <a:extLst>
+              <a:ext uri="{FF2B5EF4-FFF2-40B4-BE49-F238E27FC236}">
+                <a16:creationId xmlns:a16="http://schemas.microsoft.com/office/drawing/2014/main" id="{376A17E2-ED59-B247-87EC-9A8013F266CA}"/>
+              </a:ext>
+            </a:extLst>
+          </p:cNvPr>
+          <p:cNvSpPr>
+            <a:spLocks noGrp="1"/>
+          </p:cNvSpPr>
+          <p:nvPr>
+            <p:ph idx="1"/>
+          </p:nvPr>
+        </p:nvSpPr>
+        <p:spPr/>
+        <p:txBody>
+          <a:bodyPr/>
+          <a:lstStyle/>
+          <a:p>
+            <a:r>
+              <a:rPr lang="en-US" dirty="0"/>
+              <a:t>Programming is like art</a:t>
+            </a:r>
+          </a:p>
+          <a:p>
+            <a:r>
+              <a:rPr lang="en-US" dirty="0"/>
+              <a:t>Programming is part science</a:t>
+            </a:r>
+          </a:p>
+          <a:p>
+            <a:r>
+              <a:rPr lang="en-US" dirty="0"/>
+              <a:t>Programming is like a craft</a:t>
+            </a:r>
+          </a:p>
+          <a:p>
+            <a:r>
+              <a:rPr lang="en-US" dirty="0"/>
+              <a:t>It is all abut problem solving</a:t>
+            </a:r>
+          </a:p>
+          <a:p>
+            <a:r>
+              <a:rPr lang="en-US" dirty="0"/>
+              <a:t>There will be recipes</a:t>
+            </a:r>
+          </a:p>
+          <a:p>
+            <a:r>
+              <a:rPr lang="en-US" dirty="0"/>
+              <a:t>Three things to become a good programmer: PRACTICE, PRACTICE, PRACTICE</a:t>
+            </a:r>
+          </a:p>
+          <a:p>
+            <a:pPr marL="0" indent="0">
+              <a:buNone/>
+            </a:pPr>
+            <a:endParaRPr lang="en-US" dirty="0"/>
+          </a:p>
+        </p:txBody>
+      </p:sp>
+    </p:spTree>
+    <p:extLst>
+      <p:ext uri="{BB962C8B-B14F-4D97-AF65-F5344CB8AC3E}">
+        <p14:creationId xmlns:p14="http://schemas.microsoft.com/office/powerpoint/2010/main" val="3014265805"/>
+      </p:ext>
+    </p:extLst>
+  </p:cSld>
+  <p:clrMapOvr>
+    <a:masterClrMapping/>
+  </p:clrMapOvr>
+</p:sld>
+</file>
+
+<file path=ppt/slides/slide8.xml><?xml version="1.0" encoding="utf-8"?>
+<p:sld xmlns:a="http://schemas.openxmlformats.org/drawingml/2006/main" xmlns:r="http://schemas.openxmlformats.org/officeDocument/2006/relationships" xmlns:p="http://schemas.openxmlformats.org/presentationml/2006/main">
+  <p:cSld>
+    <p:spTree>
+      <p:nvGrpSpPr>
+        <p:cNvPr id="1" name=""/>
+        <p:cNvGrpSpPr/>
+        <p:nvPr/>
+      </p:nvGrpSpPr>
+      <p:grpSpPr>
+        <a:xfrm>
+          <a:off x="0" y="0"/>
+          <a:ext cx="0" cy="0"/>
+          <a:chOff x="0" y="0"/>
+          <a:chExt cx="0" cy="0"/>
+        </a:xfrm>
+      </p:grpSpPr>
       <p:sp>
         <p:nvSpPr>
           <p:cNvPr id="2" name="Title 1">
@@ -4761,6 +6081,30 @@
             </a:r>
           </a:p>
           <a:p>
+            <a:r>
+              <a:rPr lang="en-US" dirty="0"/>
+              <a:t>Where to begin on something like this?</a:t>
+            </a:r>
+          </a:p>
+          <a:p>
+            <a:r>
+              <a:rPr lang="en-US" dirty="0"/>
+              <a:t>Break a problem down?</a:t>
+            </a:r>
+          </a:p>
+          <a:p>
+            <a:r>
+              <a:rPr lang="en-US" dirty="0"/>
+              <a:t>Different types of problems – require different types of approaches</a:t>
+            </a:r>
+          </a:p>
+          <a:p>
+            <a:r>
+              <a:rPr lang="en-US" dirty="0"/>
+              <a:t>Fundamentals are essential to tackling complex problems</a:t>
+            </a:r>
+          </a:p>
+          <a:p>
             <a:endParaRPr lang="en-US" dirty="0"/>
           </a:p>
         </p:txBody>
@@ -4769,6 +6113,93 @@
     <p:extLst>
       <p:ext uri="{BB962C8B-B14F-4D97-AF65-F5344CB8AC3E}">
         <p14:creationId xmlns:p14="http://schemas.microsoft.com/office/powerpoint/2010/main" val="4196156562"/>
+      </p:ext>
+    </p:extLst>
+  </p:cSld>
+  <p:clrMapOvr>
+    <a:masterClrMapping/>
+  </p:clrMapOvr>
+</p:sld>
+</file>
+
+<file path=ppt/slides/slide9.xml><?xml version="1.0" encoding="utf-8"?>
+<p:sld xmlns:a="http://schemas.openxmlformats.org/drawingml/2006/main" xmlns:r="http://schemas.openxmlformats.org/officeDocument/2006/relationships" xmlns:p="http://schemas.openxmlformats.org/presentationml/2006/main">
+  <p:cSld>
+    <p:spTree>
+      <p:nvGrpSpPr>
+        <p:cNvPr id="1" name=""/>
+        <p:cNvGrpSpPr/>
+        <p:nvPr/>
+      </p:nvGrpSpPr>
+      <p:grpSpPr>
+        <a:xfrm>
+          <a:off x="0" y="0"/>
+          <a:ext cx="0" cy="0"/>
+          <a:chOff x="0" y="0"/>
+          <a:chExt cx="0" cy="0"/>
+        </a:xfrm>
+      </p:grpSpPr>
+      <p:sp>
+        <p:nvSpPr>
+          <p:cNvPr id="2" name="Title 1">
+            <a:extLst>
+              <a:ext uri="{FF2B5EF4-FFF2-40B4-BE49-F238E27FC236}">
+                <a16:creationId xmlns:a16="http://schemas.microsoft.com/office/drawing/2014/main" id="{D22045D0-3EE1-BE4F-9B3C-E691251FCA5E}"/>
+              </a:ext>
+            </a:extLst>
+          </p:cNvPr>
+          <p:cNvSpPr>
+            <a:spLocks noGrp="1"/>
+          </p:cNvSpPr>
+          <p:nvPr>
+            <p:ph type="title"/>
+          </p:nvPr>
+        </p:nvSpPr>
+        <p:spPr/>
+        <p:txBody>
+          <a:bodyPr/>
+          <a:lstStyle/>
+          <a:p>
+            <a:r>
+              <a:rPr lang="en-US" dirty="0"/>
+              <a:t>Break until 3PM Central/4PM Eastern</a:t>
+            </a:r>
+          </a:p>
+        </p:txBody>
+      </p:sp>
+      <p:pic>
+        <p:nvPicPr>
+          <p:cNvPr id="5" name="Content Placeholder 4" descr="A cup of coffee and a glass of beer on a table&#10;&#10;Description automatically generated">
+            <a:extLst>
+              <a:ext uri="{FF2B5EF4-FFF2-40B4-BE49-F238E27FC236}">
+                <a16:creationId xmlns:a16="http://schemas.microsoft.com/office/drawing/2014/main" id="{867364E2-25C7-2E45-88A9-E90D05844818}"/>
+              </a:ext>
+            </a:extLst>
+          </p:cNvPr>
+          <p:cNvPicPr>
+            <a:picLocks noGrp="1" noChangeAspect="1"/>
+          </p:cNvPicPr>
+          <p:nvPr>
+            <p:ph idx="1"/>
+          </p:nvPr>
+        </p:nvPicPr>
+        <p:blipFill>
+          <a:blip r:embed="rId2"/>
+          <a:stretch>
+            <a:fillRect/>
+          </a:stretch>
+        </p:blipFill>
+        <p:spPr>
+          <a:xfrm>
+            <a:off x="687833" y="2098675"/>
+            <a:ext cx="4444108" cy="3633787"/>
+          </a:xfrm>
+        </p:spPr>
+      </p:pic>
+    </p:spTree>
+    <p:extLst>
+      <p:ext uri="{BB962C8B-B14F-4D97-AF65-F5344CB8AC3E}">
+        <p14:creationId xmlns:p14="http://schemas.microsoft.com/office/powerpoint/2010/main" val="3576552389"/>
       </p:ext>
     </p:extLst>
   </p:cSld>

</xml_diff>